<commit_message>
0804 0536 up lab
</commit_message>
<xml_diff>
--- a/darknet_withC.pptx
+++ b/darknet_withC.pptx
@@ -21,6 +21,7 @@
     <p:sldId id="276" r:id="rId15"/>
     <p:sldId id="272" r:id="rId16"/>
     <p:sldId id="281" r:id="rId17"/>
+    <p:sldId id="282" r:id="rId18"/>
   </p:sldIdLst>
   <p:sldSz cx="12192000" cy="6858000"/>
   <p:notesSz cx="6858000" cy="9144000"/>
@@ -318,7 +319,7 @@
           <a:p>
             <a:fld id="{8F186270-8102-4A14-AA74-8937BBD30F05}" type="datetimeFigureOut">
               <a:rPr lang="ko-KR" altLang="en-US" smtClean="0"/>
-              <a:t>2020-07-31</a:t>
+              <a:t>2020-08-03</a:t>
             </a:fld>
             <a:endParaRPr lang="ko-KR" altLang="en-US"/>
           </a:p>
@@ -516,7 +517,7 @@
           <a:p>
             <a:fld id="{8F186270-8102-4A14-AA74-8937BBD30F05}" type="datetimeFigureOut">
               <a:rPr lang="ko-KR" altLang="en-US" smtClean="0"/>
-              <a:t>2020-07-31</a:t>
+              <a:t>2020-08-03</a:t>
             </a:fld>
             <a:endParaRPr lang="ko-KR" altLang="en-US"/>
           </a:p>
@@ -724,7 +725,7 @@
           <a:p>
             <a:fld id="{8F186270-8102-4A14-AA74-8937BBD30F05}" type="datetimeFigureOut">
               <a:rPr lang="ko-KR" altLang="en-US" smtClean="0"/>
-              <a:t>2020-07-31</a:t>
+              <a:t>2020-08-03</a:t>
             </a:fld>
             <a:endParaRPr lang="ko-KR" altLang="en-US"/>
           </a:p>
@@ -922,7 +923,7 @@
           <a:p>
             <a:fld id="{8F186270-8102-4A14-AA74-8937BBD30F05}" type="datetimeFigureOut">
               <a:rPr lang="ko-KR" altLang="en-US" smtClean="0"/>
-              <a:t>2020-07-31</a:t>
+              <a:t>2020-08-03</a:t>
             </a:fld>
             <a:endParaRPr lang="ko-KR" altLang="en-US"/>
           </a:p>
@@ -1197,7 +1198,7 @@
           <a:p>
             <a:fld id="{8F186270-8102-4A14-AA74-8937BBD30F05}" type="datetimeFigureOut">
               <a:rPr lang="ko-KR" altLang="en-US" smtClean="0"/>
-              <a:t>2020-07-31</a:t>
+              <a:t>2020-08-03</a:t>
             </a:fld>
             <a:endParaRPr lang="ko-KR" altLang="en-US"/>
           </a:p>
@@ -1462,7 +1463,7 @@
           <a:p>
             <a:fld id="{8F186270-8102-4A14-AA74-8937BBD30F05}" type="datetimeFigureOut">
               <a:rPr lang="ko-KR" altLang="en-US" smtClean="0"/>
-              <a:t>2020-07-31</a:t>
+              <a:t>2020-08-03</a:t>
             </a:fld>
             <a:endParaRPr lang="ko-KR" altLang="en-US"/>
           </a:p>
@@ -1874,7 +1875,7 @@
           <a:p>
             <a:fld id="{8F186270-8102-4A14-AA74-8937BBD30F05}" type="datetimeFigureOut">
               <a:rPr lang="ko-KR" altLang="en-US" smtClean="0"/>
-              <a:t>2020-07-31</a:t>
+              <a:t>2020-08-03</a:t>
             </a:fld>
             <a:endParaRPr lang="ko-KR" altLang="en-US"/>
           </a:p>
@@ -2015,7 +2016,7 @@
           <a:p>
             <a:fld id="{8F186270-8102-4A14-AA74-8937BBD30F05}" type="datetimeFigureOut">
               <a:rPr lang="ko-KR" altLang="en-US" smtClean="0"/>
-              <a:t>2020-07-31</a:t>
+              <a:t>2020-08-03</a:t>
             </a:fld>
             <a:endParaRPr lang="ko-KR" altLang="en-US"/>
           </a:p>
@@ -2128,7 +2129,7 @@
           <a:p>
             <a:fld id="{8F186270-8102-4A14-AA74-8937BBD30F05}" type="datetimeFigureOut">
               <a:rPr lang="ko-KR" altLang="en-US" smtClean="0"/>
-              <a:t>2020-07-31</a:t>
+              <a:t>2020-08-03</a:t>
             </a:fld>
             <a:endParaRPr lang="ko-KR" altLang="en-US"/>
           </a:p>
@@ -2439,7 +2440,7 @@
           <a:p>
             <a:fld id="{8F186270-8102-4A14-AA74-8937BBD30F05}" type="datetimeFigureOut">
               <a:rPr lang="ko-KR" altLang="en-US" smtClean="0"/>
-              <a:t>2020-07-31</a:t>
+              <a:t>2020-08-03</a:t>
             </a:fld>
             <a:endParaRPr lang="ko-KR" altLang="en-US"/>
           </a:p>
@@ -2727,7 +2728,7 @@
           <a:p>
             <a:fld id="{8F186270-8102-4A14-AA74-8937BBD30F05}" type="datetimeFigureOut">
               <a:rPr lang="ko-KR" altLang="en-US" smtClean="0"/>
-              <a:t>2020-07-31</a:t>
+              <a:t>2020-08-03</a:t>
             </a:fld>
             <a:endParaRPr lang="ko-KR" altLang="en-US"/>
           </a:p>
@@ -2968,7 +2969,7 @@
           <a:p>
             <a:fld id="{8F186270-8102-4A14-AA74-8937BBD30F05}" type="datetimeFigureOut">
               <a:rPr lang="ko-KR" altLang="en-US" smtClean="0"/>
-              <a:t>2020-07-31</a:t>
+              <a:t>2020-08-03</a:t>
             </a:fld>
             <a:endParaRPr lang="ko-KR" altLang="en-US"/>
           </a:p>
@@ -5273,6 +5274,114 @@
 </p:sld>
 </file>
 
+<file path=ppt/slides/slide17.xml><?xml version="1.0" encoding="utf-8"?>
+<p:sld xmlns:a="http://schemas.openxmlformats.org/drawingml/2006/main" xmlns:r="http://schemas.openxmlformats.org/officeDocument/2006/relationships" xmlns:p="http://schemas.openxmlformats.org/presentationml/2006/main">
+  <p:cSld>
+    <p:spTree>
+      <p:nvGrpSpPr>
+        <p:cNvPr id="1" name=""/>
+        <p:cNvGrpSpPr/>
+        <p:nvPr/>
+      </p:nvGrpSpPr>
+      <p:grpSpPr>
+        <a:xfrm>
+          <a:off x="0" y="0"/>
+          <a:ext cx="0" cy="0"/>
+          <a:chOff x="0" y="0"/>
+          <a:chExt cx="0" cy="0"/>
+        </a:xfrm>
+      </p:grpSpPr>
+      <p:sp>
+        <p:nvSpPr>
+          <p:cNvPr id="2" name="제목 1">
+            <a:extLst>
+              <a:ext uri="{FF2B5EF4-FFF2-40B4-BE49-F238E27FC236}">
+                <a16:creationId xmlns:a16="http://schemas.microsoft.com/office/drawing/2014/main" id="{E0E55B61-7C0A-46B8-BCC5-0EEBFF96DE94}"/>
+              </a:ext>
+            </a:extLst>
+          </p:cNvPr>
+          <p:cNvSpPr>
+            <a:spLocks noGrp="1"/>
+          </p:cNvSpPr>
+          <p:nvPr>
+            <p:ph type="title"/>
+          </p:nvPr>
+        </p:nvSpPr>
+        <p:spPr/>
+        <p:txBody>
+          <a:bodyPr/>
+          <a:lstStyle/>
+          <a:p>
+            <a:endParaRPr lang="ko-KR" altLang="en-US" dirty="0"/>
+          </a:p>
+        </p:txBody>
+      </p:sp>
+      <p:sp>
+        <p:nvSpPr>
+          <p:cNvPr id="3" name="내용 개체 틀 2">
+            <a:extLst>
+              <a:ext uri="{FF2B5EF4-FFF2-40B4-BE49-F238E27FC236}">
+                <a16:creationId xmlns:a16="http://schemas.microsoft.com/office/drawing/2014/main" id="{0C3BA14C-B473-4FED-8E55-F79E54796CC7}"/>
+              </a:ext>
+            </a:extLst>
+          </p:cNvPr>
+          <p:cNvSpPr>
+            <a:spLocks noGrp="1"/>
+          </p:cNvSpPr>
+          <p:nvPr>
+            <p:ph sz="half" idx="1"/>
+          </p:nvPr>
+        </p:nvSpPr>
+        <p:spPr/>
+        <p:txBody>
+          <a:bodyPr/>
+          <a:lstStyle/>
+          <a:p>
+            <a:r>
+              <a:rPr lang="ko-KR" altLang="en-US" dirty="0"/>
+              <a:t>연결리스트 그림으로 만들어서 활용</a:t>
+            </a:r>
+          </a:p>
+        </p:txBody>
+      </p:sp>
+      <p:sp>
+        <p:nvSpPr>
+          <p:cNvPr id="4" name="내용 개체 틀 3">
+            <a:extLst>
+              <a:ext uri="{FF2B5EF4-FFF2-40B4-BE49-F238E27FC236}">
+                <a16:creationId xmlns:a16="http://schemas.microsoft.com/office/drawing/2014/main" id="{3A919376-C509-44F3-BC5C-DD2E2EF40038}"/>
+              </a:ext>
+            </a:extLst>
+          </p:cNvPr>
+          <p:cNvSpPr>
+            <a:spLocks noGrp="1"/>
+          </p:cNvSpPr>
+          <p:nvPr>
+            <p:ph sz="half" idx="2"/>
+          </p:nvPr>
+        </p:nvSpPr>
+        <p:spPr/>
+        <p:txBody>
+          <a:bodyPr/>
+          <a:lstStyle/>
+          <a:p>
+            <a:endParaRPr lang="ko-KR" altLang="en-US"/>
+          </a:p>
+        </p:txBody>
+      </p:sp>
+    </p:spTree>
+    <p:extLst>
+      <p:ext uri="{BB962C8B-B14F-4D97-AF65-F5344CB8AC3E}">
+        <p14:creationId xmlns:p14="http://schemas.microsoft.com/office/powerpoint/2010/main" val="887802984"/>
+      </p:ext>
+    </p:extLst>
+  </p:cSld>
+  <p:clrMapOvr>
+    <a:masterClrMapping/>
+  </p:clrMapOvr>
+</p:sld>
+</file>
+
 <file path=ppt/slides/slide2.xml><?xml version="1.0" encoding="utf-8"?>
 <p:sld xmlns:a="http://schemas.openxmlformats.org/drawingml/2006/main" xmlns:r="http://schemas.openxmlformats.org/officeDocument/2006/relationships" xmlns:p="http://schemas.openxmlformats.org/presentationml/2006/main">
   <p:cSld>

</xml_diff>